<commit_message>
1. Re-formating files complying lint 2. move script reference to the end before <body> for page loading optimization 3. remove old html file
</commit_message>
<xml_diff>
--- a/doc/Gatherhub Logo Design.pptx
+++ b/doc/Gatherhub Logo Design.pptx
@@ -2956,6 +2956,17 @@
 <file path=ppt/slides/slide1.xml><?xml version="1.0" encoding="utf-8"?>
 <p:sld xmlns:a="http://schemas.openxmlformats.org/drawingml/2006/main" xmlns:r="http://schemas.openxmlformats.org/officeDocument/2006/relationships" xmlns:p="http://schemas.openxmlformats.org/presentationml/2006/main">
   <p:cSld>
+    <p:bg>
+      <p:bgPr>
+        <a:solidFill>
+          <a:schemeClr val="accent4">
+            <a:lumMod val="40000"/>
+            <a:lumOff val="60000"/>
+          </a:schemeClr>
+        </a:solidFill>
+        <a:effectLst/>
+      </p:bgPr>
+    </p:bg>
     <p:spTree>
       <p:nvGrpSpPr>
         <p:cNvPr id="1" name=""/>

</xml_diff>